<commit_message>
Adding a comment to presentation.
</commit_message>
<xml_diff>
--- a/DNUG Introduction to StructureMap.pptx
+++ b/DNUG Introduction to StructureMap.pptx
@@ -112,6 +112,11 @@
       </a:defRPr>
     </a:lvl9pPr>
   </p:defaultTextStyle>
+  <p:extLst>
+    <p:ext uri="{EFAFB233-063F-42B5-8137-9DF3F51BA10A}">
+      <p15:sldGuideLst xmlns:p15="http://schemas.microsoft.com/office/powerpoint/2012/main"/>
+    </p:ext>
+  </p:extLst>
 </p:presentation>
 </file>
 
@@ -197,7 +202,7 @@
           <a:p>
             <a:fld id="{57E80B5D-C863-4CED-AF92-95F24E650074}" type="datetimeFigureOut">
               <a:rPr lang="en-US" smtClean="0"/>
-              <a:t>5/19/2015</a:t>
+              <a:t>5/20/2015</a:t>
             </a:fld>
             <a:endParaRPr lang="en-US"/>
           </a:p>
@@ -563,8 +568,92 @@
           <a:p>
             <a:r>
               <a:rPr lang="en-US" baseline="0" dirty="0" smtClean="0"/>
-              <a:t>Dependency Inversion is the last principle in the SOLID principles.</a:t>
-            </a:r>
+              <a:t>Dependency Inversion is the last principle in the SOLID principles</a:t>
+            </a:r>
+            <a:r>
+              <a:rPr lang="en-US" baseline="0" dirty="0" smtClean="0"/>
+              <a:t>.</a:t>
+            </a:r>
+          </a:p>
+          <a:p>
+            <a:endParaRPr lang="en-US" baseline="0" dirty="0" smtClean="0"/>
+          </a:p>
+          <a:p>
+            <a:r>
+              <a:rPr lang="en-US" dirty="0" smtClean="0"/>
+              <a:t>Single responsibility principle</a:t>
+            </a:r>
+          </a:p>
+          <a:p>
+            <a:r>
+              <a:rPr lang="en-US" dirty="0" smtClean="0"/>
+              <a:t>a class should have only a single responsibility (i.e. only one potential change in the software's specification should be able to affect the specification of the class)</a:t>
+            </a:r>
+          </a:p>
+          <a:p>
+            <a:endParaRPr lang="en-US" dirty="0" smtClean="0"/>
+          </a:p>
+          <a:p>
+            <a:r>
+              <a:rPr lang="en-US" dirty="0" smtClean="0"/>
+              <a:t>Open/closed principle</a:t>
+            </a:r>
+          </a:p>
+          <a:p>
+            <a:r>
+              <a:rPr lang="en-US" dirty="0" smtClean="0"/>
+              <a:t>“software entities … should be open for extension, but closed for modification.”</a:t>
+            </a:r>
+          </a:p>
+          <a:p>
+            <a:endParaRPr lang="en-US" dirty="0" smtClean="0"/>
+          </a:p>
+          <a:p>
+            <a:r>
+              <a:rPr lang="en-US" dirty="0" err="1" smtClean="0"/>
+              <a:t>Liskov</a:t>
+            </a:r>
+            <a:r>
+              <a:rPr lang="en-US" dirty="0" smtClean="0"/>
+              <a:t> substitution principle</a:t>
+            </a:r>
+          </a:p>
+          <a:p>
+            <a:r>
+              <a:rPr lang="en-US" dirty="0" smtClean="0"/>
+              <a:t>“objects in a program should be replaceable with instances of their subtypes without altering the correctness of that program.” See also design by contract.</a:t>
+            </a:r>
+          </a:p>
+          <a:p>
+            <a:endParaRPr lang="en-US" dirty="0" smtClean="0"/>
+          </a:p>
+          <a:p>
+            <a:r>
+              <a:rPr lang="en-US" dirty="0" smtClean="0"/>
+              <a:t>Interface segregation principle</a:t>
+            </a:r>
+          </a:p>
+          <a:p>
+            <a:r>
+              <a:rPr lang="en-US" dirty="0" smtClean="0"/>
+              <a:t>“many client-specific interfaces are better than one general-purpose interface.”</a:t>
+            </a:r>
+          </a:p>
+          <a:p>
+            <a:endParaRPr lang="en-US" dirty="0" smtClean="0"/>
+          </a:p>
+          <a:p>
+            <a:r>
+              <a:rPr lang="en-US" dirty="0" smtClean="0"/>
+              <a:t>Dependency inversion principle</a:t>
+            </a:r>
+          </a:p>
+          <a:p>
+            <a:r>
+              <a:rPr lang="en-US" dirty="0" smtClean="0"/>
+              <a:t>one should “Depend upon Abstractions. Do not depend upon concretions.”</a:t>
+            </a:r>
+            <a:endParaRPr lang="en-US" baseline="0" dirty="0" smtClean="0"/>
           </a:p>
         </p:txBody>
       </p:sp>
@@ -1323,7 +1412,7 @@
             <a:fld id="{B61BEF0D-F0BB-DE4B-95CE-6DB70DBA9567}" type="datetimeFigureOut">
               <a:rPr lang="en-US" dirty="0"/>
               <a:pPr/>
-              <a:t>5/19/2015</a:t>
+              <a:t>5/20/2015</a:t>
             </a:fld>
             <a:endParaRPr lang="en-US" dirty="0"/>
           </a:p>
@@ -1616,7 +1705,7 @@
             <a:fld id="{B61BEF0D-F0BB-DE4B-95CE-6DB70DBA9567}" type="datetimeFigureOut">
               <a:rPr lang="en-US" dirty="0"/>
               <a:pPr/>
-              <a:t>5/19/2015</a:t>
+              <a:t>5/20/2015</a:t>
             </a:fld>
             <a:endParaRPr lang="en-US" dirty="0"/>
           </a:p>
@@ -1861,7 +1950,7 @@
             <a:fld id="{B61BEF0D-F0BB-DE4B-95CE-6DB70DBA9567}" type="datetimeFigureOut">
               <a:rPr lang="en-US" dirty="0"/>
               <a:pPr/>
-              <a:t>5/19/2015</a:t>
+              <a:t>5/20/2015</a:t>
             </a:fld>
             <a:endParaRPr lang="en-US" dirty="0"/>
           </a:p>
@@ -2398,7 +2487,7 @@
             <a:fld id="{B61BEF0D-F0BB-DE4B-95CE-6DB70DBA9567}" type="datetimeFigureOut">
               <a:rPr lang="en-US" dirty="0"/>
               <a:pPr/>
-              <a:t>5/19/2015</a:t>
+              <a:t>5/20/2015</a:t>
             </a:fld>
             <a:endParaRPr lang="en-US" dirty="0"/>
           </a:p>
@@ -2643,7 +2732,7 @@
             <a:fld id="{B61BEF0D-F0BB-DE4B-95CE-6DB70DBA9567}" type="datetimeFigureOut">
               <a:rPr lang="en-US" dirty="0"/>
               <a:pPr/>
-              <a:t>5/19/2015</a:t>
+              <a:t>5/20/2015</a:t>
             </a:fld>
             <a:endParaRPr lang="en-US" dirty="0"/>
           </a:p>
@@ -3172,7 +3261,7 @@
             <a:fld id="{B61BEF0D-F0BB-DE4B-95CE-6DB70DBA9567}" type="datetimeFigureOut">
               <a:rPr lang="en-US" dirty="0"/>
               <a:pPr/>
-              <a:t>5/19/2015</a:t>
+              <a:t>5/20/2015</a:t>
             </a:fld>
             <a:endParaRPr lang="en-US" dirty="0"/>
           </a:p>
@@ -3466,7 +3555,7 @@
             <a:fld id="{B61BEF0D-F0BB-DE4B-95CE-6DB70DBA9567}" type="datetimeFigureOut">
               <a:rPr lang="en-US" dirty="0"/>
               <a:pPr/>
-              <a:t>5/19/2015</a:t>
+              <a:t>5/20/2015</a:t>
             </a:fld>
             <a:endParaRPr lang="en-US" dirty="0"/>
           </a:p>
@@ -3637,7 +3726,7 @@
             <a:fld id="{B61BEF0D-F0BB-DE4B-95CE-6DB70DBA9567}" type="datetimeFigureOut">
               <a:rPr lang="en-US" dirty="0"/>
               <a:pPr/>
-              <a:t>5/19/2015</a:t>
+              <a:t>5/20/2015</a:t>
             </a:fld>
             <a:endParaRPr lang="en-US" dirty="0"/>
           </a:p>
@@ -3814,7 +3903,7 @@
             <a:fld id="{B61BEF0D-F0BB-DE4B-95CE-6DB70DBA9567}" type="datetimeFigureOut">
               <a:rPr lang="en-US" dirty="0"/>
               <a:pPr/>
-              <a:t>5/19/2015</a:t>
+              <a:t>5/20/2015</a:t>
             </a:fld>
             <a:endParaRPr lang="en-US" dirty="0"/>
           </a:p>
@@ -3981,7 +4070,7 @@
             <a:fld id="{B61BEF0D-F0BB-DE4B-95CE-6DB70DBA9567}" type="datetimeFigureOut">
               <a:rPr lang="en-US" dirty="0"/>
               <a:pPr/>
-              <a:t>5/19/2015</a:t>
+              <a:t>5/20/2015</a:t>
             </a:fld>
             <a:endParaRPr lang="en-US" dirty="0"/>
           </a:p>
@@ -4229,7 +4318,7 @@
             <a:fld id="{B61BEF0D-F0BB-DE4B-95CE-6DB70DBA9567}" type="datetimeFigureOut">
               <a:rPr lang="en-US" dirty="0"/>
               <a:pPr/>
-              <a:t>5/19/2015</a:t>
+              <a:t>5/20/2015</a:t>
             </a:fld>
             <a:endParaRPr lang="en-US" dirty="0"/>
           </a:p>
@@ -4523,7 +4612,7 @@
             <a:fld id="{B61BEF0D-F0BB-DE4B-95CE-6DB70DBA9567}" type="datetimeFigureOut">
               <a:rPr lang="en-US" dirty="0"/>
               <a:pPr/>
-              <a:t>5/19/2015</a:t>
+              <a:t>5/20/2015</a:t>
             </a:fld>
             <a:endParaRPr lang="en-US" dirty="0"/>
           </a:p>
@@ -4962,7 +5051,7 @@
             <a:fld id="{B61BEF0D-F0BB-DE4B-95CE-6DB70DBA9567}" type="datetimeFigureOut">
               <a:rPr lang="en-US" dirty="0"/>
               <a:pPr/>
-              <a:t>5/19/2015</a:t>
+              <a:t>5/20/2015</a:t>
             </a:fld>
             <a:endParaRPr lang="en-US" dirty="0"/>
           </a:p>
@@ -5077,7 +5166,7 @@
             <a:fld id="{B61BEF0D-F0BB-DE4B-95CE-6DB70DBA9567}" type="datetimeFigureOut">
               <a:rPr lang="en-US" dirty="0"/>
               <a:pPr/>
-              <a:t>5/19/2015</a:t>
+              <a:t>5/20/2015</a:t>
             </a:fld>
             <a:endParaRPr lang="en-US" dirty="0"/>
           </a:p>
@@ -5169,7 +5258,7 @@
             <a:fld id="{B61BEF0D-F0BB-DE4B-95CE-6DB70DBA9567}" type="datetimeFigureOut">
               <a:rPr lang="en-US" dirty="0"/>
               <a:pPr/>
-              <a:t>5/19/2015</a:t>
+              <a:t>5/20/2015</a:t>
             </a:fld>
             <a:endParaRPr lang="en-US" dirty="0"/>
           </a:p>
@@ -5449,7 +5538,7 @@
             <a:fld id="{B61BEF0D-F0BB-DE4B-95CE-6DB70DBA9567}" type="datetimeFigureOut">
               <a:rPr lang="en-US" dirty="0"/>
               <a:pPr/>
-              <a:t>5/19/2015</a:t>
+              <a:t>5/20/2015</a:t>
             </a:fld>
             <a:endParaRPr lang="en-US" dirty="0"/>
           </a:p>
@@ -5737,7 +5826,7 @@
             <a:fld id="{B61BEF0D-F0BB-DE4B-95CE-6DB70DBA9567}" type="datetimeFigureOut">
               <a:rPr lang="en-US" dirty="0"/>
               <a:pPr/>
-              <a:t>5/19/2015</a:t>
+              <a:t>5/20/2015</a:t>
             </a:fld>
             <a:endParaRPr lang="en-US" dirty="0"/>
           </a:p>
@@ -6264,7 +6353,7 @@
             <a:fld id="{B61BEF0D-F0BB-DE4B-95CE-6DB70DBA9567}" type="datetimeFigureOut">
               <a:rPr lang="en-US" dirty="0"/>
               <a:pPr/>
-              <a:t>5/19/2015</a:t>
+              <a:t>5/20/2015</a:t>
             </a:fld>
             <a:endParaRPr lang="en-US" dirty="0"/>
           </a:p>

</xml_diff>